<commit_message>
fixed typo on slide 6
</commit_message>
<xml_diff>
--- a/cs1501_rec1_Sept6.pptx
+++ b/cs1501_rec1_Sept6.pptx
@@ -246,7 +246,7 @@
           <a:p>
             <a:fld id="{79DACF82-7282-4538-9925-81D795D18BF0}" type="datetimeFigureOut">
               <a:rPr lang="en-US" smtClean="0"/>
-              <a:t>9/5/2019</a:t>
+              <a:t>9/6/2019</a:t>
             </a:fld>
             <a:endParaRPr lang="en-US"/>
           </a:p>
@@ -644,7 +644,7 @@
           <a:p>
             <a:fld id="{7880F47B-3C72-48E5-9CD2-8B9AE0E9AFF7}" type="datetimeFigureOut">
               <a:rPr lang="en-US" smtClean="0"/>
-              <a:t>9/5/2019</a:t>
+              <a:t>9/6/2019</a:t>
             </a:fld>
             <a:endParaRPr lang="en-US"/>
           </a:p>
@@ -814,7 +814,7 @@
           <a:p>
             <a:fld id="{7880F47B-3C72-48E5-9CD2-8B9AE0E9AFF7}" type="datetimeFigureOut">
               <a:rPr lang="en-US" smtClean="0"/>
-              <a:t>9/5/2019</a:t>
+              <a:t>9/6/2019</a:t>
             </a:fld>
             <a:endParaRPr lang="en-US"/>
           </a:p>
@@ -994,7 +994,7 @@
           <a:p>
             <a:fld id="{7880F47B-3C72-48E5-9CD2-8B9AE0E9AFF7}" type="datetimeFigureOut">
               <a:rPr lang="en-US" smtClean="0"/>
-              <a:t>9/5/2019</a:t>
+              <a:t>9/6/2019</a:t>
             </a:fld>
             <a:endParaRPr lang="en-US"/>
           </a:p>
@@ -1164,7 +1164,7 @@
           <a:p>
             <a:fld id="{7880F47B-3C72-48E5-9CD2-8B9AE0E9AFF7}" type="datetimeFigureOut">
               <a:rPr lang="en-US" smtClean="0"/>
-              <a:t>9/5/2019</a:t>
+              <a:t>9/6/2019</a:t>
             </a:fld>
             <a:endParaRPr lang="en-US"/>
           </a:p>
@@ -1408,7 +1408,7 @@
           <a:p>
             <a:fld id="{7880F47B-3C72-48E5-9CD2-8B9AE0E9AFF7}" type="datetimeFigureOut">
               <a:rPr lang="en-US" smtClean="0"/>
-              <a:t>9/5/2019</a:t>
+              <a:t>9/6/2019</a:t>
             </a:fld>
             <a:endParaRPr lang="en-US"/>
           </a:p>
@@ -1640,7 +1640,7 @@
           <a:p>
             <a:fld id="{7880F47B-3C72-48E5-9CD2-8B9AE0E9AFF7}" type="datetimeFigureOut">
               <a:rPr lang="en-US" smtClean="0"/>
-              <a:t>9/5/2019</a:t>
+              <a:t>9/6/2019</a:t>
             </a:fld>
             <a:endParaRPr lang="en-US"/>
           </a:p>
@@ -2007,7 +2007,7 @@
           <a:p>
             <a:fld id="{7880F47B-3C72-48E5-9CD2-8B9AE0E9AFF7}" type="datetimeFigureOut">
               <a:rPr lang="en-US" smtClean="0"/>
-              <a:t>9/5/2019</a:t>
+              <a:t>9/6/2019</a:t>
             </a:fld>
             <a:endParaRPr lang="en-US"/>
           </a:p>
@@ -2125,7 +2125,7 @@
           <a:p>
             <a:fld id="{7880F47B-3C72-48E5-9CD2-8B9AE0E9AFF7}" type="datetimeFigureOut">
               <a:rPr lang="en-US" smtClean="0"/>
-              <a:t>9/5/2019</a:t>
+              <a:t>9/6/2019</a:t>
             </a:fld>
             <a:endParaRPr lang="en-US"/>
           </a:p>
@@ -2220,7 +2220,7 @@
           <a:p>
             <a:fld id="{7880F47B-3C72-48E5-9CD2-8B9AE0E9AFF7}" type="datetimeFigureOut">
               <a:rPr lang="en-US" smtClean="0"/>
-              <a:t>9/5/2019</a:t>
+              <a:t>9/6/2019</a:t>
             </a:fld>
             <a:endParaRPr lang="en-US"/>
           </a:p>
@@ -2497,7 +2497,7 @@
           <a:p>
             <a:fld id="{7880F47B-3C72-48E5-9CD2-8B9AE0E9AFF7}" type="datetimeFigureOut">
               <a:rPr lang="en-US" smtClean="0"/>
-              <a:t>9/5/2019</a:t>
+              <a:t>9/6/2019</a:t>
             </a:fld>
             <a:endParaRPr lang="en-US"/>
           </a:p>
@@ -2754,7 +2754,7 @@
           <a:p>
             <a:fld id="{7880F47B-3C72-48E5-9CD2-8B9AE0E9AFF7}" type="datetimeFigureOut">
               <a:rPr lang="en-US" smtClean="0"/>
-              <a:t>9/5/2019</a:t>
+              <a:t>9/6/2019</a:t>
             </a:fld>
             <a:endParaRPr lang="en-US"/>
           </a:p>
@@ -2967,7 +2967,7 @@
           <a:p>
             <a:fld id="{7880F47B-3C72-48E5-9CD2-8B9AE0E9AFF7}" type="datetimeFigureOut">
               <a:rPr lang="en-US" smtClean="0"/>
-              <a:t>9/5/2019</a:t>
+              <a:t>9/6/2019</a:t>
             </a:fld>
             <a:endParaRPr lang="en-US"/>
           </a:p>
@@ -3523,6 +3523,13 @@
   <p:clrMapOvr>
     <a:masterClrMapping/>
   </p:clrMapOvr>
+  <p:timing>
+    <p:tnLst>
+      <p:par>
+        <p:cTn id="1" dur="indefinite" restart="never" nodeType="tmRoot"/>
+      </p:par>
+    </p:tnLst>
+  </p:timing>
 </p:sld>
 </file>
 
@@ -3580,7 +3587,7 @@
           <p:cNvPr id="3" name="TextBox 2">
             <a:extLst>
               <a:ext uri="{FF2B5EF4-FFF2-40B4-BE49-F238E27FC236}">
-                <a16:creationId xmlns:a16="http://schemas.microsoft.com/office/drawing/2014/main" id="{0CE8D138-01A8-423A-ADB0-476023D78A5D}"/>
+                <a16:creationId xmlns:a16="http://schemas.microsoft.com/office/drawing/2014/main" xmlns="" id="{0CE8D138-01A8-423A-ADB0-476023D78A5D}"/>
               </a:ext>
             </a:extLst>
           </p:cNvPr>
@@ -3720,7 +3727,7 @@
           <p:cNvPr id="4" name="TextBox 3">
             <a:extLst>
               <a:ext uri="{FF2B5EF4-FFF2-40B4-BE49-F238E27FC236}">
-                <a16:creationId xmlns:a16="http://schemas.microsoft.com/office/drawing/2014/main" id="{D2776697-C2A1-4676-9852-92ACE106A991}"/>
+                <a16:creationId xmlns:a16="http://schemas.microsoft.com/office/drawing/2014/main" xmlns="" id="{D2776697-C2A1-4676-9852-92ACE106A991}"/>
               </a:ext>
             </a:extLst>
           </p:cNvPr>
@@ -3879,7 +3886,7 @@
           <p:cNvPr id="4" name="TextBox 3">
             <a:extLst>
               <a:ext uri="{FF2B5EF4-FFF2-40B4-BE49-F238E27FC236}">
-                <a16:creationId xmlns:a16="http://schemas.microsoft.com/office/drawing/2014/main" id="{D2776697-C2A1-4676-9852-92ACE106A991}"/>
+                <a16:creationId xmlns:a16="http://schemas.microsoft.com/office/drawing/2014/main" xmlns="" id="{D2776697-C2A1-4676-9852-92ACE106A991}"/>
               </a:ext>
             </a:extLst>
           </p:cNvPr>
@@ -3918,7 +3925,7 @@
           <p:cNvPr id="12" name="Picture 11" descr="MINGW64:/c/Users/Karin">
             <a:extLst>
               <a:ext uri="{FF2B5EF4-FFF2-40B4-BE49-F238E27FC236}">
-                <a16:creationId xmlns:a16="http://schemas.microsoft.com/office/drawing/2014/main" id="{80578CE3-D6FC-40DD-888D-6B2F8FBE1D2C}"/>
+                <a16:creationId xmlns:a16="http://schemas.microsoft.com/office/drawing/2014/main" xmlns="" id="{80578CE3-D6FC-40DD-888D-6B2F8FBE1D2C}"/>
               </a:ext>
             </a:extLst>
           </p:cNvPr>
@@ -3984,7 +3991,7 @@
           <p:cNvPr id="2" name="TextBox 1">
             <a:extLst>
               <a:ext uri="{FF2B5EF4-FFF2-40B4-BE49-F238E27FC236}">
-                <a16:creationId xmlns:a16="http://schemas.microsoft.com/office/drawing/2014/main" id="{63E565D0-1AE1-4BF6-A06E-9E3D6ED2185B}"/>
+                <a16:creationId xmlns:a16="http://schemas.microsoft.com/office/drawing/2014/main" xmlns="" id="{63E565D0-1AE1-4BF6-A06E-9E3D6ED2185B}"/>
               </a:ext>
             </a:extLst>
           </p:cNvPr>
@@ -4022,7 +4029,7 @@
           <p:cNvPr id="9" name="TextBox 8">
             <a:extLst>
               <a:ext uri="{FF2B5EF4-FFF2-40B4-BE49-F238E27FC236}">
-                <a16:creationId xmlns:a16="http://schemas.microsoft.com/office/drawing/2014/main" id="{64D94D03-2363-4381-848B-CA87C7BA9A63}"/>
+                <a16:creationId xmlns:a16="http://schemas.microsoft.com/office/drawing/2014/main" xmlns="" id="{64D94D03-2363-4381-848B-CA87C7BA9A63}"/>
               </a:ext>
             </a:extLst>
           </p:cNvPr>
@@ -4057,7 +4064,7 @@
           <p:cNvPr id="4" name="Picture 3" descr="MINGW64:/c/Users/Karin">
             <a:extLst>
               <a:ext uri="{FF2B5EF4-FFF2-40B4-BE49-F238E27FC236}">
-                <a16:creationId xmlns:a16="http://schemas.microsoft.com/office/drawing/2014/main" id="{08EF0452-C9EC-4BC1-BFB2-5F03EE22F850}"/>
+                <a16:creationId xmlns:a16="http://schemas.microsoft.com/office/drawing/2014/main" xmlns="" id="{08EF0452-C9EC-4BC1-BFB2-5F03EE22F850}"/>
               </a:ext>
             </a:extLst>
           </p:cNvPr>
@@ -4123,7 +4130,7 @@
           <p:cNvPr id="2" name="TextBox 1">
             <a:extLst>
               <a:ext uri="{FF2B5EF4-FFF2-40B4-BE49-F238E27FC236}">
-                <a16:creationId xmlns:a16="http://schemas.microsoft.com/office/drawing/2014/main" id="{63E565D0-1AE1-4BF6-A06E-9E3D6ED2185B}"/>
+                <a16:creationId xmlns:a16="http://schemas.microsoft.com/office/drawing/2014/main" xmlns="" id="{63E565D0-1AE1-4BF6-A06E-9E3D6ED2185B}"/>
               </a:ext>
             </a:extLst>
           </p:cNvPr>
@@ -4161,7 +4168,7 @@
           <p:cNvPr id="6" name="TextBox 5">
             <a:extLst>
               <a:ext uri="{FF2B5EF4-FFF2-40B4-BE49-F238E27FC236}">
-                <a16:creationId xmlns:a16="http://schemas.microsoft.com/office/drawing/2014/main" id="{B7664B76-A823-4DE7-975A-078C74DB3A7D}"/>
+                <a16:creationId xmlns:a16="http://schemas.microsoft.com/office/drawing/2014/main" xmlns="" id="{B7664B76-A823-4DE7-975A-078C74DB3A7D}"/>
               </a:ext>
             </a:extLst>
           </p:cNvPr>
@@ -4195,7 +4202,7 @@
           <p:cNvPr id="10" name="TextBox 9">
             <a:extLst>
               <a:ext uri="{FF2B5EF4-FFF2-40B4-BE49-F238E27FC236}">
-                <a16:creationId xmlns:a16="http://schemas.microsoft.com/office/drawing/2014/main" id="{36E118EB-9BF6-42E6-9D69-575ACE821FF4}"/>
+                <a16:creationId xmlns:a16="http://schemas.microsoft.com/office/drawing/2014/main" xmlns="" id="{36E118EB-9BF6-42E6-9D69-575ACE821FF4}"/>
               </a:ext>
             </a:extLst>
           </p:cNvPr>
@@ -4241,7 +4248,7 @@
           <p:cNvPr id="5" name="Picture 4" descr="MINGW64:/c/Users/Karin">
             <a:extLst>
               <a:ext uri="{FF2B5EF4-FFF2-40B4-BE49-F238E27FC236}">
-                <a16:creationId xmlns:a16="http://schemas.microsoft.com/office/drawing/2014/main" id="{76ADB7D4-A548-476D-AD0D-D64BF23B9CF4}"/>
+                <a16:creationId xmlns:a16="http://schemas.microsoft.com/office/drawing/2014/main" xmlns="" id="{76ADB7D4-A548-476D-AD0D-D64BF23B9CF4}"/>
               </a:ext>
             </a:extLst>
           </p:cNvPr>
@@ -4307,7 +4314,7 @@
           <p:cNvPr id="2" name="TextBox 1">
             <a:extLst>
               <a:ext uri="{FF2B5EF4-FFF2-40B4-BE49-F238E27FC236}">
-                <a16:creationId xmlns:a16="http://schemas.microsoft.com/office/drawing/2014/main" id="{63E565D0-1AE1-4BF6-A06E-9E3D6ED2185B}"/>
+                <a16:creationId xmlns:a16="http://schemas.microsoft.com/office/drawing/2014/main" xmlns="" id="{63E565D0-1AE1-4BF6-A06E-9E3D6ED2185B}"/>
               </a:ext>
             </a:extLst>
           </p:cNvPr>
@@ -4345,7 +4352,7 @@
           <p:cNvPr id="6" name="TextBox 5">
             <a:extLst>
               <a:ext uri="{FF2B5EF4-FFF2-40B4-BE49-F238E27FC236}">
-                <a16:creationId xmlns:a16="http://schemas.microsoft.com/office/drawing/2014/main" id="{B7664B76-A823-4DE7-975A-078C74DB3A7D}"/>
+                <a16:creationId xmlns:a16="http://schemas.microsoft.com/office/drawing/2014/main" xmlns="" id="{B7664B76-A823-4DE7-975A-078C74DB3A7D}"/>
               </a:ext>
             </a:extLst>
           </p:cNvPr>
@@ -4387,7 +4394,7 @@
           <p:cNvPr id="4" name="Picture 3" descr="GitHub Login">
             <a:extLst>
               <a:ext uri="{FF2B5EF4-FFF2-40B4-BE49-F238E27FC236}">
-                <a16:creationId xmlns:a16="http://schemas.microsoft.com/office/drawing/2014/main" id="{75CA78D1-36B2-40BA-A4E8-C0BFDBB8405F}"/>
+                <a16:creationId xmlns:a16="http://schemas.microsoft.com/office/drawing/2014/main" xmlns="" id="{75CA78D1-36B2-40BA-A4E8-C0BFDBB8405F}"/>
               </a:ext>
             </a:extLst>
           </p:cNvPr>
@@ -4453,7 +4460,7 @@
           <p:cNvPr id="2" name="TextBox 1">
             <a:extLst>
               <a:ext uri="{FF2B5EF4-FFF2-40B4-BE49-F238E27FC236}">
-                <a16:creationId xmlns:a16="http://schemas.microsoft.com/office/drawing/2014/main" id="{63E565D0-1AE1-4BF6-A06E-9E3D6ED2185B}"/>
+                <a16:creationId xmlns:a16="http://schemas.microsoft.com/office/drawing/2014/main" xmlns="" id="{63E565D0-1AE1-4BF6-A06E-9E3D6ED2185B}"/>
               </a:ext>
             </a:extLst>
           </p:cNvPr>
@@ -4491,7 +4498,7 @@
           <p:cNvPr id="6" name="TextBox 5">
             <a:extLst>
               <a:ext uri="{FF2B5EF4-FFF2-40B4-BE49-F238E27FC236}">
-                <a16:creationId xmlns:a16="http://schemas.microsoft.com/office/drawing/2014/main" id="{B7664B76-A823-4DE7-975A-078C74DB3A7D}"/>
+                <a16:creationId xmlns:a16="http://schemas.microsoft.com/office/drawing/2014/main" xmlns="" id="{B7664B76-A823-4DE7-975A-078C74DB3A7D}"/>
               </a:ext>
             </a:extLst>
           </p:cNvPr>
@@ -4533,7 +4540,7 @@
           <p:cNvPr id="5" name="Picture 4" descr="MINGW64:/c/Users/Karin">
             <a:extLst>
               <a:ext uri="{FF2B5EF4-FFF2-40B4-BE49-F238E27FC236}">
-                <a16:creationId xmlns:a16="http://schemas.microsoft.com/office/drawing/2014/main" id="{6D6D58EB-5E27-439E-A479-FC3C42FB808E}"/>
+                <a16:creationId xmlns:a16="http://schemas.microsoft.com/office/drawing/2014/main" xmlns="" id="{6D6D58EB-5E27-439E-A479-FC3C42FB808E}"/>
               </a:ext>
             </a:extLst>
           </p:cNvPr>
@@ -4599,7 +4606,7 @@
           <p:cNvPr id="2" name="TextBox 1">
             <a:extLst>
               <a:ext uri="{FF2B5EF4-FFF2-40B4-BE49-F238E27FC236}">
-                <a16:creationId xmlns:a16="http://schemas.microsoft.com/office/drawing/2014/main" id="{63E565D0-1AE1-4BF6-A06E-9E3D6ED2185B}"/>
+                <a16:creationId xmlns:a16="http://schemas.microsoft.com/office/drawing/2014/main" xmlns="" id="{63E565D0-1AE1-4BF6-A06E-9E3D6ED2185B}"/>
               </a:ext>
             </a:extLst>
           </p:cNvPr>
@@ -4637,7 +4644,7 @@
           <p:cNvPr id="6" name="TextBox 5">
             <a:extLst>
               <a:ext uri="{FF2B5EF4-FFF2-40B4-BE49-F238E27FC236}">
-                <a16:creationId xmlns:a16="http://schemas.microsoft.com/office/drawing/2014/main" id="{B7664B76-A823-4DE7-975A-078C74DB3A7D}"/>
+                <a16:creationId xmlns:a16="http://schemas.microsoft.com/office/drawing/2014/main" xmlns="" id="{B7664B76-A823-4DE7-975A-078C74DB3A7D}"/>
               </a:ext>
             </a:extLst>
           </p:cNvPr>
@@ -4671,7 +4678,7 @@
           <p:cNvPr id="4" name="Picture 3" descr="MINGW64:/c/Users/Karin/kmc51-project0">
             <a:extLst>
               <a:ext uri="{FF2B5EF4-FFF2-40B4-BE49-F238E27FC236}">
-                <a16:creationId xmlns:a16="http://schemas.microsoft.com/office/drawing/2014/main" id="{BF15BB13-BFB4-4490-968E-DA0AE26DFF95}"/>
+                <a16:creationId xmlns:a16="http://schemas.microsoft.com/office/drawing/2014/main" xmlns="" id="{BF15BB13-BFB4-4490-968E-DA0AE26DFF95}"/>
               </a:ext>
             </a:extLst>
           </p:cNvPr>
@@ -4737,7 +4744,7 @@
           <p:cNvPr id="2" name="TextBox 1">
             <a:extLst>
               <a:ext uri="{FF2B5EF4-FFF2-40B4-BE49-F238E27FC236}">
-                <a16:creationId xmlns:a16="http://schemas.microsoft.com/office/drawing/2014/main" id="{63E565D0-1AE1-4BF6-A06E-9E3D6ED2185B}"/>
+                <a16:creationId xmlns:a16="http://schemas.microsoft.com/office/drawing/2014/main" xmlns="" id="{63E565D0-1AE1-4BF6-A06E-9E3D6ED2185B}"/>
               </a:ext>
             </a:extLst>
           </p:cNvPr>
@@ -4775,7 +4782,7 @@
           <p:cNvPr id="5" name="Picture 4" descr="PittCS1501/kmc51-project0: project0 created for kmc51 - Mozilla Firefox">
             <a:extLst>
               <a:ext uri="{FF2B5EF4-FFF2-40B4-BE49-F238E27FC236}">
-                <a16:creationId xmlns:a16="http://schemas.microsoft.com/office/drawing/2014/main" id="{05556DC7-3332-4FCC-9BF1-3CE57FAF1ED8}"/>
+                <a16:creationId xmlns:a16="http://schemas.microsoft.com/office/drawing/2014/main" xmlns="" id="{05556DC7-3332-4FCC-9BF1-3CE57FAF1ED8}"/>
               </a:ext>
             </a:extLst>
           </p:cNvPr>
@@ -4815,7 +4822,7 @@
           <p:cNvPr id="7" name="Picture 6" descr="MINGW64:/c/Users/Karin/kmc51-project0">
             <a:extLst>
               <a:ext uri="{FF2B5EF4-FFF2-40B4-BE49-F238E27FC236}">
-                <a16:creationId xmlns:a16="http://schemas.microsoft.com/office/drawing/2014/main" id="{94695FFE-EC2E-48BF-A2C1-92BC2F70A09C}"/>
+                <a16:creationId xmlns:a16="http://schemas.microsoft.com/office/drawing/2014/main" xmlns="" id="{94695FFE-EC2E-48BF-A2C1-92BC2F70A09C}"/>
               </a:ext>
             </a:extLst>
           </p:cNvPr>
@@ -4851,7 +4858,7 @@
           <p:cNvPr id="9" name="Picture 8" descr="MINGW64:/c/Users/Karin/kmc51-project0">
             <a:extLst>
               <a:ext uri="{FF2B5EF4-FFF2-40B4-BE49-F238E27FC236}">
-                <a16:creationId xmlns:a16="http://schemas.microsoft.com/office/drawing/2014/main" id="{D05D4C00-F75B-4282-9564-4892C0C80FFC}"/>
+                <a16:creationId xmlns:a16="http://schemas.microsoft.com/office/drawing/2014/main" xmlns="" id="{D05D4C00-F75B-4282-9564-4892C0C80FFC}"/>
               </a:ext>
             </a:extLst>
           </p:cNvPr>
@@ -4917,7 +4924,7 @@
           <p:cNvPr id="2" name="TextBox 1">
             <a:extLst>
               <a:ext uri="{FF2B5EF4-FFF2-40B4-BE49-F238E27FC236}">
-                <a16:creationId xmlns:a16="http://schemas.microsoft.com/office/drawing/2014/main" id="{63E565D0-1AE1-4BF6-A06E-9E3D6ED2185B}"/>
+                <a16:creationId xmlns:a16="http://schemas.microsoft.com/office/drawing/2014/main" xmlns="" id="{63E565D0-1AE1-4BF6-A06E-9E3D6ED2185B}"/>
               </a:ext>
             </a:extLst>
           </p:cNvPr>
@@ -4955,7 +4962,7 @@
           <p:cNvPr id="5" name="Picture 4" descr="PittCS1501/kmc51-project0: project0 created for kmc51 - Mozilla Firefox">
             <a:extLst>
               <a:ext uri="{FF2B5EF4-FFF2-40B4-BE49-F238E27FC236}">
-                <a16:creationId xmlns:a16="http://schemas.microsoft.com/office/drawing/2014/main" id="{05556DC7-3332-4FCC-9BF1-3CE57FAF1ED8}"/>
+                <a16:creationId xmlns:a16="http://schemas.microsoft.com/office/drawing/2014/main" xmlns="" id="{05556DC7-3332-4FCC-9BF1-3CE57FAF1ED8}"/>
               </a:ext>
             </a:extLst>
           </p:cNvPr>
@@ -4995,7 +5002,7 @@
           <p:cNvPr id="4" name="Picture 3" descr="MINGW64:/c/Users/Karin/kmc51-project0">
             <a:extLst>
               <a:ext uri="{FF2B5EF4-FFF2-40B4-BE49-F238E27FC236}">
-                <a16:creationId xmlns:a16="http://schemas.microsoft.com/office/drawing/2014/main" id="{AA11B22D-4B1D-4A03-BC78-7217C2F31A77}"/>
+                <a16:creationId xmlns:a16="http://schemas.microsoft.com/office/drawing/2014/main" xmlns="" id="{AA11B22D-4B1D-4A03-BC78-7217C2F31A77}"/>
               </a:ext>
             </a:extLst>
           </p:cNvPr>
@@ -5163,7 +5170,15 @@
             </a:r>
             <a:r>
               <a:rPr lang="en-US" sz="2400" dirty="0"/>
-              <a:t>: Grading will be done by a different TA see course website for contact info) </a:t>
+              <a:t>: Grading will be done by a different TA </a:t>
+            </a:r>
+            <a:r>
+              <a:rPr lang="en-US" sz="2400" dirty="0" smtClean="0"/>
+              <a:t>(see </a:t>
+            </a:r>
+            <a:r>
+              <a:rPr lang="en-US" sz="2400" dirty="0"/>
+              <a:t>course website for contact info) </a:t>
             </a:r>
           </a:p>
         </p:txBody>
@@ -5178,6 +5193,13 @@
   <p:clrMapOvr>
     <a:masterClrMapping/>
   </p:clrMapOvr>
+  <p:timing>
+    <p:tnLst>
+      <p:par>
+        <p:cTn id="1" dur="indefinite" restart="never" nodeType="tmRoot"/>
+      </p:par>
+    </p:tnLst>
+  </p:timing>
 </p:sld>
 </file>
 
@@ -5203,7 +5225,7 @@
           <p:cNvPr id="2" name="TextBox 1">
             <a:extLst>
               <a:ext uri="{FF2B5EF4-FFF2-40B4-BE49-F238E27FC236}">
-                <a16:creationId xmlns:a16="http://schemas.microsoft.com/office/drawing/2014/main" id="{63E565D0-1AE1-4BF6-A06E-9E3D6ED2185B}"/>
+                <a16:creationId xmlns:a16="http://schemas.microsoft.com/office/drawing/2014/main" xmlns="" id="{63E565D0-1AE1-4BF6-A06E-9E3D6ED2185B}"/>
               </a:ext>
             </a:extLst>
           </p:cNvPr>
@@ -5241,7 +5263,7 @@
           <p:cNvPr id="12" name="Picture 11" descr="PittCS1501/kmc51-project0: project0 created for kmc51 - Mozilla Firefox">
             <a:extLst>
               <a:ext uri="{FF2B5EF4-FFF2-40B4-BE49-F238E27FC236}">
-                <a16:creationId xmlns:a16="http://schemas.microsoft.com/office/drawing/2014/main" id="{3FFDB99C-9B3A-4850-895B-359D7DBD28B3}"/>
+                <a16:creationId xmlns:a16="http://schemas.microsoft.com/office/drawing/2014/main" xmlns="" id="{3FFDB99C-9B3A-4850-895B-359D7DBD28B3}"/>
               </a:ext>
             </a:extLst>
           </p:cNvPr>
@@ -5281,7 +5303,7 @@
           <p:cNvPr id="4" name="Straight Arrow Connector 3">
             <a:extLst>
               <a:ext uri="{FF2B5EF4-FFF2-40B4-BE49-F238E27FC236}">
-                <a16:creationId xmlns:a16="http://schemas.microsoft.com/office/drawing/2014/main" id="{A4A8D075-87F8-4EB0-808C-56DF2352A2BC}"/>
+                <a16:creationId xmlns:a16="http://schemas.microsoft.com/office/drawing/2014/main" xmlns="" id="{A4A8D075-87F8-4EB0-808C-56DF2352A2BC}"/>
               </a:ext>
             </a:extLst>
           </p:cNvPr>
@@ -5325,7 +5347,7 @@
           <p:cNvPr id="15" name="TextBox 14">
             <a:extLst>
               <a:ext uri="{FF2B5EF4-FFF2-40B4-BE49-F238E27FC236}">
-                <a16:creationId xmlns:a16="http://schemas.microsoft.com/office/drawing/2014/main" id="{8BDDE45D-3D41-47EE-8713-9873AAC295B3}"/>
+                <a16:creationId xmlns:a16="http://schemas.microsoft.com/office/drawing/2014/main" xmlns="" id="{8BDDE45D-3D41-47EE-8713-9873AAC295B3}"/>
               </a:ext>
             </a:extLst>
           </p:cNvPr>
@@ -5374,7 +5396,7 @@
           <p:cNvPr id="5" name="Picture 4" descr="MINGW64:/c/Users/Karin/kmc51-project0">
             <a:extLst>
               <a:ext uri="{FF2B5EF4-FFF2-40B4-BE49-F238E27FC236}">
-                <a16:creationId xmlns:a16="http://schemas.microsoft.com/office/drawing/2014/main" id="{3A69AB0E-A77A-46B1-99E9-55F6E4C02E1F}"/>
+                <a16:creationId xmlns:a16="http://schemas.microsoft.com/office/drawing/2014/main" xmlns="" id="{3A69AB0E-A77A-46B1-99E9-55F6E4C02E1F}"/>
               </a:ext>
             </a:extLst>
           </p:cNvPr>
@@ -5440,7 +5462,7 @@
           <p:cNvPr id="2" name="TextBox 1">
             <a:extLst>
               <a:ext uri="{FF2B5EF4-FFF2-40B4-BE49-F238E27FC236}">
-                <a16:creationId xmlns:a16="http://schemas.microsoft.com/office/drawing/2014/main" id="{63E565D0-1AE1-4BF6-A06E-9E3D6ED2185B}"/>
+                <a16:creationId xmlns:a16="http://schemas.microsoft.com/office/drawing/2014/main" xmlns="" id="{63E565D0-1AE1-4BF6-A06E-9E3D6ED2185B}"/>
               </a:ext>
             </a:extLst>
           </p:cNvPr>
@@ -5478,7 +5500,7 @@
           <p:cNvPr id="5" name="Picture 4" descr="PittCS1501/kmc51-project0: Project 0 repository created for kmc51 - Mozilla Firefox">
             <a:extLst>
               <a:ext uri="{FF2B5EF4-FFF2-40B4-BE49-F238E27FC236}">
-                <a16:creationId xmlns:a16="http://schemas.microsoft.com/office/drawing/2014/main" id="{2D71404B-0E07-4794-894F-E471C3FD4728}"/>
+                <a16:creationId xmlns:a16="http://schemas.microsoft.com/office/drawing/2014/main" xmlns="" id="{2D71404B-0E07-4794-894F-E471C3FD4728}"/>
               </a:ext>
             </a:extLst>
           </p:cNvPr>
@@ -5518,7 +5540,7 @@
           <p:cNvPr id="10" name="Picture 9" descr="MINGW64:/c/Users/Karin/kmc51-project0">
             <a:extLst>
               <a:ext uri="{FF2B5EF4-FFF2-40B4-BE49-F238E27FC236}">
-                <a16:creationId xmlns:a16="http://schemas.microsoft.com/office/drawing/2014/main" id="{84BA198D-651C-4919-BF1E-445532796D26}"/>
+                <a16:creationId xmlns:a16="http://schemas.microsoft.com/office/drawing/2014/main" xmlns="" id="{84BA198D-651C-4919-BF1E-445532796D26}"/>
               </a:ext>
             </a:extLst>
           </p:cNvPr>
@@ -5554,7 +5576,7 @@
           <p:cNvPr id="11" name="TextBox 10">
             <a:extLst>
               <a:ext uri="{FF2B5EF4-FFF2-40B4-BE49-F238E27FC236}">
-                <a16:creationId xmlns:a16="http://schemas.microsoft.com/office/drawing/2014/main" id="{1CA9A351-D479-4D6C-B7ED-4EC6C3AB3A67}"/>
+                <a16:creationId xmlns:a16="http://schemas.microsoft.com/office/drawing/2014/main" xmlns="" id="{1CA9A351-D479-4D6C-B7ED-4EC6C3AB3A67}"/>
               </a:ext>
             </a:extLst>
           </p:cNvPr>
@@ -5623,7 +5645,7 @@
           <p:cNvPr id="2" name="TextBox 1">
             <a:extLst>
               <a:ext uri="{FF2B5EF4-FFF2-40B4-BE49-F238E27FC236}">
-                <a16:creationId xmlns:a16="http://schemas.microsoft.com/office/drawing/2014/main" id="{63E565D0-1AE1-4BF6-A06E-9E3D6ED2185B}"/>
+                <a16:creationId xmlns:a16="http://schemas.microsoft.com/office/drawing/2014/main" xmlns="" id="{63E565D0-1AE1-4BF6-A06E-9E3D6ED2185B}"/>
               </a:ext>
             </a:extLst>
           </p:cNvPr>
@@ -5661,7 +5683,7 @@
           <p:cNvPr id="5" name="Picture 4" descr="PittCS1501/kmc51-project0: Project 0 repository created for kmc51 - Mozilla Firefox">
             <a:extLst>
               <a:ext uri="{FF2B5EF4-FFF2-40B4-BE49-F238E27FC236}">
-                <a16:creationId xmlns:a16="http://schemas.microsoft.com/office/drawing/2014/main" id="{2D71404B-0E07-4794-894F-E471C3FD4728}"/>
+                <a16:creationId xmlns:a16="http://schemas.microsoft.com/office/drawing/2014/main" xmlns="" id="{2D71404B-0E07-4794-894F-E471C3FD4728}"/>
               </a:ext>
             </a:extLst>
           </p:cNvPr>
@@ -5701,7 +5723,7 @@
           <p:cNvPr id="4" name="Picture 3" descr="MINGW64:/c/Users/Karin/kmc51-project0">
             <a:extLst>
               <a:ext uri="{FF2B5EF4-FFF2-40B4-BE49-F238E27FC236}">
-                <a16:creationId xmlns:a16="http://schemas.microsoft.com/office/drawing/2014/main" id="{BD26D403-87EA-46EC-94B0-D38590FC3DAC}"/>
+                <a16:creationId xmlns:a16="http://schemas.microsoft.com/office/drawing/2014/main" xmlns="" id="{BD26D403-87EA-46EC-94B0-D38590FC3DAC}"/>
               </a:ext>
             </a:extLst>
           </p:cNvPr>
@@ -5767,7 +5789,7 @@
           <p:cNvPr id="2" name="TextBox 1">
             <a:extLst>
               <a:ext uri="{FF2B5EF4-FFF2-40B4-BE49-F238E27FC236}">
-                <a16:creationId xmlns:a16="http://schemas.microsoft.com/office/drawing/2014/main" id="{63E565D0-1AE1-4BF6-A06E-9E3D6ED2185B}"/>
+                <a16:creationId xmlns:a16="http://schemas.microsoft.com/office/drawing/2014/main" xmlns="" id="{63E565D0-1AE1-4BF6-A06E-9E3D6ED2185B}"/>
               </a:ext>
             </a:extLst>
           </p:cNvPr>
@@ -5805,7 +5827,7 @@
           <p:cNvPr id="7" name="Rectangle 6">
             <a:extLst>
               <a:ext uri="{FF2B5EF4-FFF2-40B4-BE49-F238E27FC236}">
-                <a16:creationId xmlns:a16="http://schemas.microsoft.com/office/drawing/2014/main" id="{95D3989E-815E-48BF-B29F-8BED17AA4631}"/>
+                <a16:creationId xmlns:a16="http://schemas.microsoft.com/office/drawing/2014/main" xmlns="" id="{95D3989E-815E-48BF-B29F-8BED17AA4631}"/>
               </a:ext>
             </a:extLst>
           </p:cNvPr>
@@ -5844,7 +5866,7 @@
           <p:cNvPr id="8" name="TextBox 7">
             <a:extLst>
               <a:ext uri="{FF2B5EF4-FFF2-40B4-BE49-F238E27FC236}">
-                <a16:creationId xmlns:a16="http://schemas.microsoft.com/office/drawing/2014/main" id="{B7510D58-79F8-49EA-B6C6-693B48AF1CAB}"/>
+                <a16:creationId xmlns:a16="http://schemas.microsoft.com/office/drawing/2014/main" xmlns="" id="{B7510D58-79F8-49EA-B6C6-693B48AF1CAB}"/>
               </a:ext>
             </a:extLst>
           </p:cNvPr>
@@ -5945,7 +5967,7 @@
           <p:cNvPr id="4" name="Picture 3" descr="MINGW64:/c/Users/Karin/kmc51-project0">
             <a:extLst>
               <a:ext uri="{FF2B5EF4-FFF2-40B4-BE49-F238E27FC236}">
-                <a16:creationId xmlns:a16="http://schemas.microsoft.com/office/drawing/2014/main" id="{F8755A37-426C-4446-A35B-329FE3F5C618}"/>
+                <a16:creationId xmlns:a16="http://schemas.microsoft.com/office/drawing/2014/main" xmlns="" id="{F8755A37-426C-4446-A35B-329FE3F5C618}"/>
               </a:ext>
             </a:extLst>
           </p:cNvPr>
@@ -6011,7 +6033,7 @@
           <p:cNvPr id="2" name="TextBox 1">
             <a:extLst>
               <a:ext uri="{FF2B5EF4-FFF2-40B4-BE49-F238E27FC236}">
-                <a16:creationId xmlns:a16="http://schemas.microsoft.com/office/drawing/2014/main" id="{63E565D0-1AE1-4BF6-A06E-9E3D6ED2185B}"/>
+                <a16:creationId xmlns:a16="http://schemas.microsoft.com/office/drawing/2014/main" xmlns="" id="{63E565D0-1AE1-4BF6-A06E-9E3D6ED2185B}"/>
               </a:ext>
             </a:extLst>
           </p:cNvPr>
@@ -6049,7 +6071,7 @@
           <p:cNvPr id="7" name="Rectangle 6">
             <a:extLst>
               <a:ext uri="{FF2B5EF4-FFF2-40B4-BE49-F238E27FC236}">
-                <a16:creationId xmlns:a16="http://schemas.microsoft.com/office/drawing/2014/main" id="{95D3989E-815E-48BF-B29F-8BED17AA4631}"/>
+                <a16:creationId xmlns:a16="http://schemas.microsoft.com/office/drawing/2014/main" xmlns="" id="{95D3989E-815E-48BF-B29F-8BED17AA4631}"/>
               </a:ext>
             </a:extLst>
           </p:cNvPr>
@@ -6088,7 +6110,7 @@
           <p:cNvPr id="5" name="Picture 4" descr="MINGW64:/c/Users/Karin/kmc51-project0">
             <a:extLst>
               <a:ext uri="{FF2B5EF4-FFF2-40B4-BE49-F238E27FC236}">
-                <a16:creationId xmlns:a16="http://schemas.microsoft.com/office/drawing/2014/main" id="{6421F542-63BB-4A50-A71C-81D4C492554D}"/>
+                <a16:creationId xmlns:a16="http://schemas.microsoft.com/office/drawing/2014/main" xmlns="" id="{6421F542-63BB-4A50-A71C-81D4C492554D}"/>
               </a:ext>
             </a:extLst>
           </p:cNvPr>
@@ -6154,7 +6176,7 @@
           <p:cNvPr id="2" name="TextBox 1">
             <a:extLst>
               <a:ext uri="{FF2B5EF4-FFF2-40B4-BE49-F238E27FC236}">
-                <a16:creationId xmlns:a16="http://schemas.microsoft.com/office/drawing/2014/main" id="{63E565D0-1AE1-4BF6-A06E-9E3D6ED2185B}"/>
+                <a16:creationId xmlns:a16="http://schemas.microsoft.com/office/drawing/2014/main" xmlns="" id="{63E565D0-1AE1-4BF6-A06E-9E3D6ED2185B}"/>
               </a:ext>
             </a:extLst>
           </p:cNvPr>
@@ -6208,7 +6230,7 @@
           <p:cNvPr id="10" name="Picture 9" descr="PittCS1501/kmc51-project0: Project 0 repository created for kmc51 - Mozilla Firefox">
             <a:extLst>
               <a:ext uri="{FF2B5EF4-FFF2-40B4-BE49-F238E27FC236}">
-                <a16:creationId xmlns:a16="http://schemas.microsoft.com/office/drawing/2014/main" id="{86B60F98-7220-4ED6-9252-EB39D4FE7332}"/>
+                <a16:creationId xmlns:a16="http://schemas.microsoft.com/office/drawing/2014/main" xmlns="" id="{86B60F98-7220-4ED6-9252-EB39D4FE7332}"/>
               </a:ext>
             </a:extLst>
           </p:cNvPr>
@@ -6278,7 +6300,7 @@
           <p:cNvPr id="2" name="TextBox 1">
             <a:extLst>
               <a:ext uri="{FF2B5EF4-FFF2-40B4-BE49-F238E27FC236}">
-                <a16:creationId xmlns:a16="http://schemas.microsoft.com/office/drawing/2014/main" id="{63E565D0-1AE1-4BF6-A06E-9E3D6ED2185B}"/>
+                <a16:creationId xmlns:a16="http://schemas.microsoft.com/office/drawing/2014/main" xmlns="" id="{63E565D0-1AE1-4BF6-A06E-9E3D6ED2185B}"/>
               </a:ext>
             </a:extLst>
           </p:cNvPr>
@@ -6332,7 +6354,7 @@
           <p:cNvPr id="4" name="TextBox 3">
             <a:extLst>
               <a:ext uri="{FF2B5EF4-FFF2-40B4-BE49-F238E27FC236}">
-                <a16:creationId xmlns:a16="http://schemas.microsoft.com/office/drawing/2014/main" id="{780DD5EB-C36B-4148-949A-A715D559FDF3}"/>
+                <a16:creationId xmlns:a16="http://schemas.microsoft.com/office/drawing/2014/main" xmlns="" id="{780DD5EB-C36B-4148-949A-A715D559FDF3}"/>
               </a:ext>
             </a:extLst>
           </p:cNvPr>
@@ -6453,7 +6475,7 @@
           <p:cNvPr id="2" name="TextBox 1">
             <a:extLst>
               <a:ext uri="{FF2B5EF4-FFF2-40B4-BE49-F238E27FC236}">
-                <a16:creationId xmlns:a16="http://schemas.microsoft.com/office/drawing/2014/main" id="{63E565D0-1AE1-4BF6-A06E-9E3D6ED2185B}"/>
+                <a16:creationId xmlns:a16="http://schemas.microsoft.com/office/drawing/2014/main" xmlns="" id="{63E565D0-1AE1-4BF6-A06E-9E3D6ED2185B}"/>
               </a:ext>
             </a:extLst>
           </p:cNvPr>
@@ -6491,7 +6513,7 @@
           <p:cNvPr id="4" name="TextBox 3">
             <a:extLst>
               <a:ext uri="{FF2B5EF4-FFF2-40B4-BE49-F238E27FC236}">
-                <a16:creationId xmlns:a16="http://schemas.microsoft.com/office/drawing/2014/main" id="{780DD5EB-C36B-4148-949A-A715D559FDF3}"/>
+                <a16:creationId xmlns:a16="http://schemas.microsoft.com/office/drawing/2014/main" xmlns="" id="{780DD5EB-C36B-4148-949A-A715D559FDF3}"/>
               </a:ext>
             </a:extLst>
           </p:cNvPr>
@@ -6847,6 +6869,13 @@
   <p:clrMapOvr>
     <a:masterClrMapping/>
   </p:clrMapOvr>
+  <p:timing>
+    <p:tnLst>
+      <p:par>
+        <p:cTn id="1" dur="indefinite" restart="never" nodeType="tmRoot"/>
+      </p:par>
+    </p:tnLst>
+  </p:timing>
 </p:sld>
 </file>
 
@@ -7185,7 +7214,7 @@
           <p:cNvPr id="3" name="TextBox 2">
             <a:extLst>
               <a:ext uri="{FF2B5EF4-FFF2-40B4-BE49-F238E27FC236}">
-                <a16:creationId xmlns:a16="http://schemas.microsoft.com/office/drawing/2014/main" id="{0CE8D138-01A8-423A-ADB0-476023D78A5D}"/>
+                <a16:creationId xmlns:a16="http://schemas.microsoft.com/office/drawing/2014/main" xmlns="" id="{0CE8D138-01A8-423A-ADB0-476023D78A5D}"/>
               </a:ext>
             </a:extLst>
           </p:cNvPr>
@@ -7252,7 +7281,15 @@
             </a:r>
             <a:r>
               <a:rPr lang="en-US" dirty="0"/>
-              <a:t> will firsts send you an email to invite you to the CS1501 organization.</a:t>
+              <a:t> will </a:t>
+            </a:r>
+            <a:r>
+              <a:rPr lang="en-US" dirty="0" smtClean="0"/>
+              <a:t>first </a:t>
+            </a:r>
+            <a:r>
+              <a:rPr lang="en-US" dirty="0"/>
+              <a:t>send you an email to invite you to the CS1501 organization.</a:t>
             </a:r>
           </a:p>
         </p:txBody>
@@ -7262,7 +7299,7 @@
           <p:cNvPr id="6" name="Picture 5" descr="PittCS1501/kmc51-project0: Project 0 repository created for kmc51 - Mozilla Firefox">
             <a:extLst>
               <a:ext uri="{FF2B5EF4-FFF2-40B4-BE49-F238E27FC236}">
-                <a16:creationId xmlns:a16="http://schemas.microsoft.com/office/drawing/2014/main" id="{CE0FCE7D-807A-46C7-A899-2E8A66B883DF}"/>
+                <a16:creationId xmlns:a16="http://schemas.microsoft.com/office/drawing/2014/main" xmlns="" id="{CE0FCE7D-807A-46C7-A899-2E8A66B883DF}"/>
               </a:ext>
             </a:extLst>
           </p:cNvPr>
@@ -7380,7 +7417,7 @@
           <p:cNvPr id="6" name="Picture 5" descr="PittCS1501/kmc51-project0: Project 0 repository created for kmc51 - Mozilla Firefox">
             <a:extLst>
               <a:ext uri="{FF2B5EF4-FFF2-40B4-BE49-F238E27FC236}">
-                <a16:creationId xmlns:a16="http://schemas.microsoft.com/office/drawing/2014/main" id="{CE0FCE7D-807A-46C7-A899-2E8A66B883DF}"/>
+                <a16:creationId xmlns:a16="http://schemas.microsoft.com/office/drawing/2014/main" xmlns="" id="{CE0FCE7D-807A-46C7-A899-2E8A66B883DF}"/>
               </a:ext>
             </a:extLst>
           </p:cNvPr>
@@ -7420,7 +7457,7 @@
           <p:cNvPr id="7" name="TextBox 6">
             <a:extLst>
               <a:ext uri="{FF2B5EF4-FFF2-40B4-BE49-F238E27FC236}">
-                <a16:creationId xmlns:a16="http://schemas.microsoft.com/office/drawing/2014/main" id="{ED52715F-DB97-441D-AAA4-23EB99E18571}"/>
+                <a16:creationId xmlns:a16="http://schemas.microsoft.com/office/drawing/2014/main" xmlns="" id="{ED52715F-DB97-441D-AAA4-23EB99E18571}"/>
               </a:ext>
             </a:extLst>
           </p:cNvPr>
@@ -7571,7 +7608,7 @@
           <p:cNvPr id="3" name="TextBox 2">
             <a:extLst>
               <a:ext uri="{FF2B5EF4-FFF2-40B4-BE49-F238E27FC236}">
-                <a16:creationId xmlns:a16="http://schemas.microsoft.com/office/drawing/2014/main" id="{0CE8D138-01A8-423A-ADB0-476023D78A5D}"/>
+                <a16:creationId xmlns:a16="http://schemas.microsoft.com/office/drawing/2014/main" xmlns="" id="{0CE8D138-01A8-423A-ADB0-476023D78A5D}"/>
               </a:ext>
             </a:extLst>
           </p:cNvPr>
@@ -7737,7 +7774,7 @@
           <p:cNvPr id="4" name="Picture 3" descr="git_crash_course.pdf - Adobe Acrobat Reader DC">
             <a:extLst>
               <a:ext uri="{FF2B5EF4-FFF2-40B4-BE49-F238E27FC236}">
-                <a16:creationId xmlns:a16="http://schemas.microsoft.com/office/drawing/2014/main" id="{4E2D6B0F-89D8-4FC2-B3F3-231A3317CE29}"/>
+                <a16:creationId xmlns:a16="http://schemas.microsoft.com/office/drawing/2014/main" xmlns="" id="{4E2D6B0F-89D8-4FC2-B3F3-231A3317CE29}"/>
               </a:ext>
             </a:extLst>
           </p:cNvPr>
@@ -7772,7 +7809,7 @@
           <p:cNvPr id="10" name="Straight Arrow Connector 9">
             <a:extLst>
               <a:ext uri="{FF2B5EF4-FFF2-40B4-BE49-F238E27FC236}">
-                <a16:creationId xmlns:a16="http://schemas.microsoft.com/office/drawing/2014/main" id="{1E8B9EAB-AC55-4E82-B0A5-73776E32D7D7}"/>
+                <a16:creationId xmlns:a16="http://schemas.microsoft.com/office/drawing/2014/main" xmlns="" id="{1E8B9EAB-AC55-4E82-B0A5-73776E32D7D7}"/>
               </a:ext>
             </a:extLst>
           </p:cNvPr>
@@ -7816,7 +7853,7 @@
           <p:cNvPr id="13" name="TextBox 12">
             <a:extLst>
               <a:ext uri="{FF2B5EF4-FFF2-40B4-BE49-F238E27FC236}">
-                <a16:creationId xmlns:a16="http://schemas.microsoft.com/office/drawing/2014/main" id="{C74B26DC-BB97-4B95-9904-8B8FC10B9981}"/>
+                <a16:creationId xmlns:a16="http://schemas.microsoft.com/office/drawing/2014/main" xmlns="" id="{C74B26DC-BB97-4B95-9904-8B8FC10B9981}"/>
               </a:ext>
             </a:extLst>
           </p:cNvPr>

</xml_diff>

<commit_message>
modified figure on slide 9
</commit_message>
<xml_diff>
--- a/cs1501_rec1_Sept6.pptx
+++ b/cs1501_rec1_Sept6.pptx
@@ -7797,7 +7797,7 @@
         <p:spPr>
           <a:xfrm>
             <a:off x="317993" y="664724"/>
-            <a:ext cx="7498080" cy="5738498"/>
+            <a:ext cx="6766560" cy="5178642"/>
           </a:xfrm>
           <a:prstGeom prst="rect">
             <a:avLst/>
@@ -7819,9 +7819,9 @@
           <p:nvPr/>
         </p:nvCxnSpPr>
         <p:spPr>
-          <a:xfrm flipH="1">
-            <a:off x="6663785" y="5263376"/>
-            <a:ext cx="1287035" cy="428095"/>
+          <a:xfrm flipV="1">
+            <a:off x="6084805" y="5211227"/>
+            <a:ext cx="999748" cy="5575"/>
           </a:xfrm>
           <a:prstGeom prst="straightConnector1">
             <a:avLst/>
@@ -7862,8 +7862,8 @@
         </p:nvSpPr>
         <p:spPr>
           <a:xfrm>
-            <a:off x="7950820" y="3790451"/>
-            <a:ext cx="1193180" cy="2585323"/>
+            <a:off x="7201316" y="4888061"/>
+            <a:ext cx="1193180" cy="1200329"/>
           </a:xfrm>
           <a:prstGeom prst="rect">
             <a:avLst/>
@@ -7877,29 +7877,122 @@
           <a:lstStyle/>
           <a:p>
             <a:r>
-              <a:rPr lang="en-US" dirty="0">
+              <a:rPr lang="en-US" dirty="0" smtClean="0">
                 <a:solidFill>
                   <a:srgbClr val="FF0000"/>
                 </a:solidFill>
               </a:rPr>
-              <a:t>Commit to local repository (additional push command needed to upload to </a:t>
-            </a:r>
-            <a:r>
-              <a:rPr lang="en-US" dirty="0" err="1">
+              <a:t>Push modified repo to </a:t>
+            </a:r>
+            <a:r>
+              <a:rPr lang="en-US" dirty="0" err="1" smtClean="0">
                 <a:solidFill>
                   <a:srgbClr val="FF0000"/>
                 </a:solidFill>
               </a:rPr>
               <a:t>Github</a:t>
             </a:r>
-            <a:r>
-              <a:rPr lang="en-US" dirty="0">
+            <a:endParaRPr lang="en-US" dirty="0">
+              <a:solidFill>
+                <a:srgbClr val="FF0000"/>
+              </a:solidFill>
+            </a:endParaRPr>
+          </a:p>
+        </p:txBody>
+      </p:sp>
+      <p:cxnSp>
+        <p:nvCxnSpPr>
+          <p:cNvPr id="7" name="Straight Arrow Connector 6">
+            <a:extLst>
+              <a:ext uri="{FF2B5EF4-FFF2-40B4-BE49-F238E27FC236}">
+                <a16:creationId xmlns:a16="http://schemas.microsoft.com/office/drawing/2014/main" xmlns="" id="{1E8B9EAB-AC55-4E82-B0A5-73776E32D7D7}"/>
+              </a:ext>
+            </a:extLst>
+          </p:cNvPr>
+          <p:cNvCxnSpPr>
+            <a:cxnSpLocks/>
+          </p:cNvCxnSpPr>
+          <p:nvPr/>
+        </p:nvCxnSpPr>
+        <p:spPr>
+          <a:xfrm flipH="1" flipV="1">
+            <a:off x="6084805" y="3743057"/>
+            <a:ext cx="999748" cy="5575"/>
+          </a:xfrm>
+          <a:prstGeom prst="straightConnector1">
+            <a:avLst/>
+          </a:prstGeom>
+          <a:ln>
+            <a:solidFill>
+              <a:srgbClr val="FF0000"/>
+            </a:solidFill>
+            <a:tailEnd type="triangle"/>
+          </a:ln>
+        </p:spPr>
+        <p:style>
+          <a:lnRef idx="1">
+            <a:schemeClr val="accent1"/>
+          </a:lnRef>
+          <a:fillRef idx="0">
+            <a:schemeClr val="accent1"/>
+          </a:fillRef>
+          <a:effectRef idx="0">
+            <a:schemeClr val="accent1"/>
+          </a:effectRef>
+          <a:fontRef idx="minor">
+            <a:schemeClr val="tx1"/>
+          </a:fontRef>
+        </p:style>
+      </p:cxnSp>
+      <p:sp>
+        <p:nvSpPr>
+          <p:cNvPr id="8" name="TextBox 7">
+            <a:extLst>
+              <a:ext uri="{FF2B5EF4-FFF2-40B4-BE49-F238E27FC236}">
+                <a16:creationId xmlns:a16="http://schemas.microsoft.com/office/drawing/2014/main" xmlns="" id="{C74B26DC-BB97-4B95-9904-8B8FC10B9981}"/>
+              </a:ext>
+            </a:extLst>
+          </p:cNvPr>
+          <p:cNvSpPr txBox="1"/>
+          <p:nvPr/>
+        </p:nvSpPr>
+        <p:spPr>
+          <a:xfrm>
+            <a:off x="7201316" y="3419891"/>
+            <a:ext cx="1193180" cy="923330"/>
+          </a:xfrm>
+          <a:prstGeom prst="rect">
+            <a:avLst/>
+          </a:prstGeom>
+          <a:noFill/>
+        </p:spPr>
+        <p:txBody>
+          <a:bodyPr wrap="square" rtlCol="0">
+            <a:spAutoFit/>
+          </a:bodyPr>
+          <a:lstStyle/>
+          <a:p>
+            <a:r>
+              <a:rPr lang="en-US" dirty="0" smtClean="0">
                 <a:solidFill>
                   <a:srgbClr val="FF0000"/>
                 </a:solidFill>
               </a:rPr>
-              <a:t>)</a:t>
-            </a:r>
+              <a:t>Clone repo from </a:t>
+            </a:r>
+            <a:r>
+              <a:rPr lang="en-US" dirty="0" err="1" smtClean="0">
+                <a:solidFill>
+                  <a:srgbClr val="FF0000"/>
+                </a:solidFill>
+              </a:rPr>
+              <a:t>Github</a:t>
+            </a:r>
+            <a:endParaRPr lang="en-US" dirty="0">
+              <a:solidFill>
+                <a:srgbClr val="FF0000"/>
+              </a:solidFill>
+            </a:endParaRPr>
           </a:p>
         </p:txBody>
       </p:sp>

</xml_diff>